<commit_message>
slide 10 svil fut
</commit_message>
<xml_diff>
--- a/presentazione_laurea/Presentazione_Laurea.pptx
+++ b/presentazione_laurea/Presentazione_Laurea.pptx
@@ -6,7 +6,7 @@
     <p:sldMasterId id="2147483661" r:id="rId2"/>
   </p:sldMasterIdLst>
   <p:notesMasterIdLst>
-    <p:notesMasterId r:id="rId13"/>
+    <p:notesMasterId r:id="rId14"/>
   </p:notesMasterIdLst>
   <p:sldIdLst>
     <p:sldId id="256" r:id="rId3"/>
@@ -18,7 +18,8 @@
     <p:sldId id="262" r:id="rId9"/>
     <p:sldId id="263" r:id="rId10"/>
     <p:sldId id="264" r:id="rId11"/>
-    <p:sldId id="265" r:id="rId12"/>
+    <p:sldId id="266" r:id="rId12"/>
+    <p:sldId id="265" r:id="rId13"/>
   </p:sldIdLst>
   <p:sldSz cx="12192000" cy="6858000"/>
   <p:notesSz cx="7559675" cy="10691813"/>
@@ -117,6 +118,11 @@
       </a:defRPr>
     </a:lvl9pPr>
   </p:defaultTextStyle>
+  <p:extLst>
+    <p:ext uri="{EFAFB233-063F-42B5-8137-9DF3F51BA10A}">
+      <p15:sldGuideLst xmlns:p15="http://schemas.microsoft.com/office/powerpoint/2012/main"/>
+    </p:ext>
+  </p:extLst>
 </p:presentation>
 </file>
 
@@ -4839,9 +4845,9 @@
           <a:stretch/>
         </p:blipFill>
         <p:spPr>
-          <a:xfrm rot="20507400">
-            <a:off x="-2001960" y="-954360"/>
-            <a:ext cx="12427200" cy="7848720"/>
+          <a:xfrm rot="20976304">
+            <a:off x="-1869137" y="-534900"/>
+            <a:ext cx="11143121" cy="7433953"/>
           </a:xfrm>
           <a:prstGeom prst="rect">
             <a:avLst/>
@@ -4859,8 +4865,8 @@
         </p:nvSpPr>
         <p:spPr>
           <a:xfrm>
-            <a:off x="7152120" y="360000"/>
-            <a:ext cx="5040000" cy="1796760"/>
+            <a:off x="7152000" y="1121427"/>
+            <a:ext cx="5040000" cy="2060649"/>
           </a:xfrm>
           <a:prstGeom prst="rect">
             <a:avLst/>
@@ -4894,16 +4900,56 @@
               </a:lnSpc>
             </a:pPr>
             <a:r>
-              <a:rPr lang="it-IT" sz="2800" b="0" strike="noStrike" spc="-1">
+              <a:rPr lang="it-IT" sz="3200" b="0" strike="noStrike" spc="-1" dirty="0">
                 <a:solidFill>
                   <a:srgbClr val="000000"/>
                 </a:solidFill>
                 <a:latin typeface="Arial"/>
                 <a:ea typeface="DejaVu Sans"/>
               </a:rPr>
-              <a:t>Studio e realizzazione di un prototipo di un sistema basato su blockchain per il mobility as a service</a:t>
+              <a:t>Studio e realizzazione di un prototipo di un sistema basato su blockchain per il </a:t>
             </a:r>
-            <a:endParaRPr lang="it-IT" sz="2800" b="0" strike="noStrike" spc="-1">
+            <a:r>
+              <a:rPr lang="it-IT" sz="3200" b="0" strike="noStrike" spc="-1" dirty="0" err="1">
+                <a:solidFill>
+                  <a:srgbClr val="000000"/>
+                </a:solidFill>
+                <a:latin typeface="Arial"/>
+                <a:ea typeface="DejaVu Sans"/>
+              </a:rPr>
+              <a:t>mobility</a:t>
+            </a:r>
+            <a:r>
+              <a:rPr lang="it-IT" sz="3200" b="0" strike="noStrike" spc="-1" dirty="0">
+                <a:solidFill>
+                  <a:srgbClr val="000000"/>
+                </a:solidFill>
+                <a:latin typeface="Arial"/>
+                <a:ea typeface="DejaVu Sans"/>
+              </a:rPr>
+              <a:t> </a:t>
+            </a:r>
+            <a:r>
+              <a:rPr lang="it-IT" sz="3200" b="0" strike="noStrike" spc="-1" dirty="0" err="1">
+                <a:solidFill>
+                  <a:srgbClr val="000000"/>
+                </a:solidFill>
+                <a:latin typeface="Arial"/>
+                <a:ea typeface="DejaVu Sans"/>
+              </a:rPr>
+              <a:t>as</a:t>
+            </a:r>
+            <a:r>
+              <a:rPr lang="it-IT" sz="3200" b="0" strike="noStrike" spc="-1" dirty="0">
+                <a:solidFill>
+                  <a:srgbClr val="000000"/>
+                </a:solidFill>
+                <a:latin typeface="Arial"/>
+                <a:ea typeface="DejaVu Sans"/>
+              </a:rPr>
+              <a:t> a service</a:t>
+            </a:r>
+            <a:endParaRPr lang="it-IT" sz="3200" b="0" strike="noStrike" spc="-1" dirty="0">
               <a:latin typeface="Arial"/>
             </a:endParaRPr>
           </a:p>
@@ -5052,6 +5098,356 @@
       </p:grpSpPr>
       <p:pic>
         <p:nvPicPr>
+          <p:cNvPr id="212" name="Immagine 19"/>
+          <p:cNvPicPr/>
+          <p:nvPr/>
+        </p:nvPicPr>
+        <p:blipFill>
+          <a:blip r:embed="rId2"/>
+          <a:srcRect r="2174" b="31141"/>
+          <a:stretch/>
+        </p:blipFill>
+        <p:spPr>
+          <a:xfrm rot="5400000" flipH="1">
+            <a:off x="-2368440" y="2372760"/>
+            <a:ext cx="6855840" cy="2114640"/>
+          </a:xfrm>
+          <a:prstGeom prst="rect">
+            <a:avLst/>
+          </a:prstGeom>
+          <a:ln w="0">
+            <a:noFill/>
+          </a:ln>
+        </p:spPr>
+      </p:pic>
+      <p:sp>
+        <p:nvSpPr>
+          <p:cNvPr id="213" name="CustomShape 1"/>
+          <p:cNvSpPr/>
+          <p:nvPr/>
+        </p:nvSpPr>
+        <p:spPr>
+          <a:xfrm>
+            <a:off x="0" y="6492240"/>
+            <a:ext cx="455760" cy="367878"/>
+          </a:xfrm>
+          <a:prstGeom prst="rect">
+            <a:avLst/>
+          </a:prstGeom>
+          <a:noFill/>
+          <a:ln w="0">
+            <a:noFill/>
+          </a:ln>
+        </p:spPr>
+        <p:style>
+          <a:lnRef idx="0">
+            <a:scrgbClr r="0" g="0" b="0"/>
+          </a:lnRef>
+          <a:fillRef idx="0">
+            <a:scrgbClr r="0" g="0" b="0"/>
+          </a:fillRef>
+          <a:effectRef idx="0">
+            <a:scrgbClr r="0" g="0" b="0"/>
+          </a:effectRef>
+          <a:fontRef idx="minor"/>
+        </p:style>
+        <p:txBody>
+          <a:bodyPr lIns="90000" tIns="45000" rIns="90000" bIns="45000" anchor="t">
+            <a:spAutoFit/>
+          </a:bodyPr>
+          <a:lstStyle/>
+          <a:p>
+            <a:pPr>
+              <a:lnSpc>
+                <a:spcPct val="100000"/>
+              </a:lnSpc>
+            </a:pPr>
+            <a:r>
+              <a:rPr lang="en-US" spc="-1" dirty="0">
+                <a:solidFill>
+                  <a:srgbClr val="000000"/>
+                </a:solidFill>
+                <a:latin typeface="Calibri"/>
+                <a:ea typeface="DejaVu Sans"/>
+              </a:rPr>
+              <a:t>1</a:t>
+            </a:r>
+            <a:r>
+              <a:rPr lang="it-IT" spc="-1" dirty="0">
+                <a:solidFill>
+                  <a:srgbClr val="000000"/>
+                </a:solidFill>
+                <a:latin typeface="Calibri"/>
+                <a:ea typeface="DejaVu Sans"/>
+              </a:rPr>
+              <a:t>0</a:t>
+            </a:r>
+            <a:endParaRPr lang="it-IT" sz="1800" b="0" strike="noStrike" spc="-1" dirty="0">
+              <a:latin typeface="Arial"/>
+            </a:endParaRPr>
+          </a:p>
+        </p:txBody>
+      </p:sp>
+      <p:sp>
+        <p:nvSpPr>
+          <p:cNvPr id="225" name="CustomShape 10"/>
+          <p:cNvSpPr/>
+          <p:nvPr/>
+        </p:nvSpPr>
+        <p:spPr>
+          <a:xfrm>
+            <a:off x="1253188" y="163828"/>
+            <a:ext cx="4602960" cy="767987"/>
+          </a:xfrm>
+          <a:prstGeom prst="rect">
+            <a:avLst/>
+          </a:prstGeom>
+          <a:noFill/>
+          <a:ln w="0">
+            <a:noFill/>
+          </a:ln>
+        </p:spPr>
+        <p:style>
+          <a:lnRef idx="0">
+            <a:scrgbClr r="0" g="0" b="0"/>
+          </a:lnRef>
+          <a:fillRef idx="0">
+            <a:scrgbClr r="0" g="0" b="0"/>
+          </a:fillRef>
+          <a:effectRef idx="0">
+            <a:scrgbClr r="0" g="0" b="0"/>
+          </a:effectRef>
+          <a:fontRef idx="minor"/>
+        </p:style>
+        <p:txBody>
+          <a:bodyPr lIns="90000" tIns="45000" rIns="90000" bIns="45000" anchor="t" anchorCtr="1">
+            <a:spAutoFit/>
+          </a:bodyPr>
+          <a:lstStyle/>
+          <a:p>
+            <a:pPr algn="ctr">
+              <a:lnSpc>
+                <a:spcPct val="100000"/>
+              </a:lnSpc>
+            </a:pPr>
+            <a:r>
+              <a:rPr lang="it-IT" sz="4400" b="1" strike="noStrike" spc="-1" dirty="0">
+                <a:solidFill>
+                  <a:srgbClr val="000000"/>
+                </a:solidFill>
+                <a:latin typeface="Calibri"/>
+                <a:ea typeface="DejaVu Sans"/>
+              </a:rPr>
+              <a:t>Sviluppi futuri</a:t>
+            </a:r>
+            <a:endParaRPr lang="it-IT" sz="4400" b="0" strike="noStrike" spc="-1" dirty="0">
+              <a:latin typeface="Arial"/>
+            </a:endParaRPr>
+          </a:p>
+        </p:txBody>
+      </p:sp>
+      <p:sp>
+        <p:nvSpPr>
+          <p:cNvPr id="2" name="CasellaDiTesto 1">
+            <a:extLst>
+              <a:ext uri="{FF2B5EF4-FFF2-40B4-BE49-F238E27FC236}">
+                <a16:creationId xmlns:a16="http://schemas.microsoft.com/office/drawing/2014/main" id="{A4CA72F0-93EA-4505-BA3C-88A774802542}"/>
+              </a:ext>
+            </a:extLst>
+          </p:cNvPr>
+          <p:cNvSpPr txBox="1"/>
+          <p:nvPr/>
+        </p:nvSpPr>
+        <p:spPr>
+          <a:xfrm>
+            <a:off x="2021152" y="1311661"/>
+            <a:ext cx="5824025" cy="2677656"/>
+          </a:xfrm>
+          <a:prstGeom prst="rect">
+            <a:avLst/>
+          </a:prstGeom>
+          <a:noFill/>
+        </p:spPr>
+        <p:txBody>
+          <a:bodyPr wrap="square" rtlCol="0">
+            <a:spAutoFit/>
+          </a:bodyPr>
+          <a:lstStyle/>
+          <a:p>
+            <a:pPr marL="285750" indent="-285750">
+              <a:buFont typeface="Arial" panose="020B0604020202020204" pitchFamily="34" charset="0"/>
+              <a:buChar char="•"/>
+            </a:pPr>
+            <a:r>
+              <a:rPr lang="it-IT" sz="2400" dirty="0"/>
+              <a:t>Portare tutti i dati all’interno della blockchain privata</a:t>
+            </a:r>
+          </a:p>
+          <a:p>
+            <a:pPr marL="285750" indent="-285750">
+              <a:buFont typeface="Arial" panose="020B0604020202020204" pitchFamily="34" charset="0"/>
+              <a:buChar char="•"/>
+            </a:pPr>
+            <a:endParaRPr lang="it-IT" sz="2400" dirty="0"/>
+          </a:p>
+          <a:p>
+            <a:pPr marL="285750" indent="-285750">
+              <a:buFont typeface="Arial" panose="020B0604020202020204" pitchFamily="34" charset="0"/>
+              <a:buChar char="•"/>
+            </a:pPr>
+            <a:endParaRPr lang="it-IT" sz="2400" dirty="0"/>
+          </a:p>
+          <a:p>
+            <a:pPr marL="285750" indent="-285750">
+              <a:buFont typeface="Arial" panose="020B0604020202020204" pitchFamily="34" charset="0"/>
+              <a:buChar char="•"/>
+            </a:pPr>
+            <a:endParaRPr lang="it-IT" sz="2400" dirty="0"/>
+          </a:p>
+          <a:p>
+            <a:pPr marL="285750" indent="-285750">
+              <a:buFont typeface="Arial" panose="020B0604020202020204" pitchFamily="34" charset="0"/>
+              <a:buChar char="•"/>
+            </a:pPr>
+            <a:r>
+              <a:rPr lang="it-IT" sz="2400" dirty="0"/>
+              <a:t>Utilizzare una blockchain pubblica per validare la blockchain privata </a:t>
+            </a:r>
+          </a:p>
+        </p:txBody>
+      </p:sp>
+      <p:pic>
+        <p:nvPicPr>
+          <p:cNvPr id="18" name="Immagine 17">
+            <a:extLst>
+              <a:ext uri="{FF2B5EF4-FFF2-40B4-BE49-F238E27FC236}">
+                <a16:creationId xmlns:a16="http://schemas.microsoft.com/office/drawing/2014/main" id="{48131412-19EA-463C-8421-040DEEEE5900}"/>
+              </a:ext>
+            </a:extLst>
+          </p:cNvPr>
+          <p:cNvPicPr/>
+          <p:nvPr/>
+        </p:nvPicPr>
+        <p:blipFill>
+          <a:blip r:embed="rId3"/>
+          <a:stretch/>
+        </p:blipFill>
+        <p:spPr>
+          <a:xfrm>
+            <a:off x="3192404" y="4623136"/>
+            <a:ext cx="1588140" cy="1601044"/>
+          </a:xfrm>
+          <a:prstGeom prst="rect">
+            <a:avLst/>
+          </a:prstGeom>
+          <a:ln w="0">
+            <a:noFill/>
+          </a:ln>
+        </p:spPr>
+      </p:pic>
+      <p:pic>
+        <p:nvPicPr>
+          <p:cNvPr id="10" name="Immagine 9">
+            <a:extLst>
+              <a:ext uri="{FF2B5EF4-FFF2-40B4-BE49-F238E27FC236}">
+                <a16:creationId xmlns:a16="http://schemas.microsoft.com/office/drawing/2014/main" id="{7F0E2270-89A8-41B8-B0E7-B345A19483A7}"/>
+              </a:ext>
+            </a:extLst>
+          </p:cNvPr>
+          <p:cNvPicPr>
+            <a:picLocks noChangeAspect="1"/>
+          </p:cNvPicPr>
+          <p:nvPr/>
+        </p:nvPicPr>
+        <p:blipFill rotWithShape="1">
+          <a:blip r:embed="rId4" cstate="print">
+            <a:extLst>
+              <a:ext uri="{28A0092B-C50C-407E-A947-70E740481C1C}">
+                <a14:useLocalDpi xmlns:a14="http://schemas.microsoft.com/office/drawing/2010/main" val="0"/>
+              </a:ext>
+            </a:extLst>
+          </a:blip>
+          <a:srcRect r="3016"/>
+          <a:stretch/>
+        </p:blipFill>
+        <p:spPr>
+          <a:xfrm rot="5400000">
+            <a:off x="6927197" y="1593201"/>
+            <a:ext cx="6855842" cy="3669444"/>
+          </a:xfrm>
+          <a:prstGeom prst="rect">
+            <a:avLst/>
+          </a:prstGeom>
+        </p:spPr>
+      </p:pic>
+      <p:pic>
+        <p:nvPicPr>
+          <p:cNvPr id="4" name="Immagine 3">
+            <a:extLst>
+              <a:ext uri="{FF2B5EF4-FFF2-40B4-BE49-F238E27FC236}">
+                <a16:creationId xmlns:a16="http://schemas.microsoft.com/office/drawing/2014/main" id="{11BDF5E6-1336-49AA-9DB9-9B5B5F81B3DE}"/>
+              </a:ext>
+            </a:extLst>
+          </p:cNvPr>
+          <p:cNvPicPr>
+            <a:picLocks noChangeAspect="1"/>
+          </p:cNvPicPr>
+          <p:nvPr/>
+        </p:nvPicPr>
+        <p:blipFill>
+          <a:blip r:embed="rId5" cstate="print">
+            <a:extLst>
+              <a:ext uri="{28A0092B-C50C-407E-A947-70E740481C1C}">
+                <a14:useLocalDpi xmlns:a14="http://schemas.microsoft.com/office/drawing/2010/main" val="0"/>
+              </a:ext>
+            </a:extLst>
+          </a:blip>
+          <a:stretch>
+            <a:fillRect/>
+          </a:stretch>
+        </p:blipFill>
+        <p:spPr>
+          <a:xfrm>
+            <a:off x="4522196" y="4518595"/>
+            <a:ext cx="4621804" cy="905063"/>
+          </a:xfrm>
+          <a:prstGeom prst="rect">
+            <a:avLst/>
+          </a:prstGeom>
+        </p:spPr>
+      </p:pic>
+    </p:spTree>
+    <p:extLst>
+      <p:ext uri="{BB962C8B-B14F-4D97-AF65-F5344CB8AC3E}">
+        <p14:creationId xmlns:p14="http://schemas.microsoft.com/office/powerpoint/2010/main" val="3872001436"/>
+      </p:ext>
+    </p:extLst>
+  </p:cSld>
+  <p:clrMapOvr>
+    <a:masterClrMapping/>
+  </p:clrMapOvr>
+</p:sld>
+</file>
+
+<file path=ppt/slides/slide11.xml><?xml version="1.0" encoding="utf-8"?>
+<p:sld xmlns:a="http://schemas.openxmlformats.org/drawingml/2006/main" xmlns:r="http://schemas.openxmlformats.org/officeDocument/2006/relationships" xmlns:p="http://schemas.openxmlformats.org/presentationml/2006/main">
+  <p:cSld>
+    <p:spTree>
+      <p:nvGrpSpPr>
+        <p:cNvPr id="1" name=""/>
+        <p:cNvGrpSpPr/>
+        <p:nvPr/>
+      </p:nvGrpSpPr>
+      <p:grpSpPr>
+        <a:xfrm>
+          <a:off x="0" y="0"/>
+          <a:ext cx="0" cy="0"/>
+          <a:chOff x="0" y="0"/>
+          <a:chExt cx="0" cy="0"/>
+        </a:xfrm>
+      </p:grpSpPr>
+      <p:pic>
+        <p:nvPicPr>
           <p:cNvPr id="227" name="Immagine 226"/>
           <p:cNvPicPr/>
           <p:nvPr/>
@@ -5091,9 +5487,7 @@
             <a:srgbClr val="8D1D75"/>
           </a:solidFill>
           <a:ln w="0">
-            <a:solidFill>
-              <a:srgbClr val="3465A4"/>
-            </a:solidFill>
+            <a:noFill/>
           </a:ln>
         </p:spPr>
         <p:style>
@@ -6100,7 +6494,7 @@
             </a:r>
           </a:p>
           <a:p>
-            <a:pPr marL="216000" indent="-216000">
+            <a:pPr>
               <a:lnSpc>
                 <a:spcPct val="100000"/>
               </a:lnSpc>
@@ -6108,14 +6502,12 @@
                 <a:srgbClr val="000000"/>
               </a:buClr>
               <a:buSzPct val="45000"/>
-              <a:buFont typeface="Wingdings" charset="2"/>
-              <a:buChar char=""/>
             </a:pPr>
             <a:r>
               <a:rPr lang="it-IT" sz="2200" b="0" strike="noStrike" spc="-1" dirty="0">
                 <a:latin typeface="Arial"/>
               </a:rPr>
-              <a:t>(Centralizzato/Decentralizzato)</a:t>
+              <a:t>   (Centralizzato/Decentralizzato)</a:t>
             </a:r>
           </a:p>
           <a:p>
@@ -11540,10 +11932,10 @@
       </p:grpSpPr>
       <p:pic>
         <p:nvPicPr>
-          <p:cNvPr id="5" name="Immagine 4">
+          <p:cNvPr id="3" name="Immagine 2">
             <a:extLst>
               <a:ext uri="{FF2B5EF4-FFF2-40B4-BE49-F238E27FC236}">
-                <a16:creationId xmlns:a16="http://schemas.microsoft.com/office/drawing/2014/main" id="{BFE89B4D-E5A6-48FA-8ADF-3E1630A7C6AF}"/>
+                <a16:creationId xmlns:a16="http://schemas.microsoft.com/office/drawing/2014/main" id="{C29AF612-8F27-464F-BA89-45BF3338E89B}"/>
               </a:ext>
             </a:extLst>
           </p:cNvPr>
@@ -11565,9 +11957,9 @@
           </a:stretch>
         </p:blipFill>
         <p:spPr>
-          <a:xfrm>
-            <a:off x="4515358" y="4135164"/>
-            <a:ext cx="1560594" cy="946416"/>
+          <a:xfrm rot="5400000">
+            <a:off x="4920602" y="3872962"/>
+            <a:ext cx="666678" cy="1474353"/>
           </a:xfrm>
           <a:prstGeom prst="rect">
             <a:avLst/>
@@ -12246,10 +12638,46 @@
       </p:sp>
       <p:pic>
         <p:nvPicPr>
-          <p:cNvPr id="22" name="Immagine 21">
+          <p:cNvPr id="7" name="Immagine 6">
             <a:extLst>
               <a:ext uri="{FF2B5EF4-FFF2-40B4-BE49-F238E27FC236}">
-                <a16:creationId xmlns:a16="http://schemas.microsoft.com/office/drawing/2014/main" id="{707D244D-1227-4318-A429-130C2FF492BF}"/>
+                <a16:creationId xmlns:a16="http://schemas.microsoft.com/office/drawing/2014/main" id="{40206E40-A6A3-4A9D-820D-4B9048F125F2}"/>
+              </a:ext>
+            </a:extLst>
+          </p:cNvPr>
+          <p:cNvPicPr>
+            <a:picLocks noChangeAspect="1"/>
+          </p:cNvPicPr>
+          <p:nvPr/>
+        </p:nvPicPr>
+        <p:blipFill>
+          <a:blip r:embed="rId8" cstate="print">
+            <a:extLst>
+              <a:ext uri="{28A0092B-C50C-407E-A947-70E740481C1C}">
+                <a14:useLocalDpi xmlns:a14="http://schemas.microsoft.com/office/drawing/2010/main" val="0"/>
+              </a:ext>
+            </a:extLst>
+          </a:blip>
+          <a:stretch>
+            <a:fillRect/>
+          </a:stretch>
+        </p:blipFill>
+        <p:spPr>
+          <a:xfrm rot="10800000">
+            <a:off x="5764278" y="4749968"/>
+            <a:ext cx="1474352" cy="1474352"/>
+          </a:xfrm>
+          <a:prstGeom prst="rect">
+            <a:avLst/>
+          </a:prstGeom>
+        </p:spPr>
+      </p:pic>
+      <p:pic>
+        <p:nvPicPr>
+          <p:cNvPr id="20" name="Immagine 19">
+            <a:extLst>
+              <a:ext uri="{FF2B5EF4-FFF2-40B4-BE49-F238E27FC236}">
+                <a16:creationId xmlns:a16="http://schemas.microsoft.com/office/drawing/2014/main" id="{AE7F45A7-B598-4F8C-8B75-61B9B1979A3F}"/>
               </a:ext>
             </a:extLst>
           </p:cNvPr>
@@ -12271,45 +12699,9 @@
           </a:stretch>
         </p:blipFill>
         <p:spPr>
-          <a:xfrm>
-            <a:off x="6901926" y="4135164"/>
-            <a:ext cx="1617840" cy="946416"/>
-          </a:xfrm>
-          <a:prstGeom prst="rect">
-            <a:avLst/>
-          </a:prstGeom>
-        </p:spPr>
-      </p:pic>
-      <p:pic>
-        <p:nvPicPr>
-          <p:cNvPr id="7" name="Immagine 6">
-            <a:extLst>
-              <a:ext uri="{FF2B5EF4-FFF2-40B4-BE49-F238E27FC236}">
-                <a16:creationId xmlns:a16="http://schemas.microsoft.com/office/drawing/2014/main" id="{40206E40-A6A3-4A9D-820D-4B9048F125F2}"/>
-              </a:ext>
-            </a:extLst>
-          </p:cNvPr>
-          <p:cNvPicPr>
-            <a:picLocks noChangeAspect="1"/>
-          </p:cNvPicPr>
-          <p:nvPr/>
-        </p:nvPicPr>
-        <p:blipFill>
-          <a:blip r:embed="rId8" cstate="print">
-            <a:extLst>
-              <a:ext uri="{28A0092B-C50C-407E-A947-70E740481C1C}">
-                <a14:useLocalDpi xmlns:a14="http://schemas.microsoft.com/office/drawing/2010/main" val="0"/>
-              </a:ext>
-            </a:extLst>
-          </a:blip>
-          <a:stretch>
-            <a:fillRect/>
-          </a:stretch>
-        </p:blipFill>
-        <p:spPr>
-          <a:xfrm rot="10800000">
-            <a:off x="5764278" y="4749968"/>
-            <a:ext cx="1474352" cy="1474352"/>
+          <a:xfrm rot="5400000">
+            <a:off x="7370154" y="3811236"/>
+            <a:ext cx="666678" cy="1474353"/>
           </a:xfrm>
           <a:prstGeom prst="rect">
             <a:avLst/>

</xml_diff>